<commit_message>
storage added to img
</commit_message>
<xml_diff>
--- a/assets/drawings.pptx
+++ b/assets/drawings.pptx
@@ -12384,9 +12384,9 @@
           <p:nvPr/>
         </p:nvCxnSpPr>
         <p:spPr>
-          <a:xfrm>
-            <a:off x="4637314" y="2332654"/>
-            <a:ext cx="0" cy="1384719"/>
+          <a:xfrm flipH="1">
+            <a:off x="4625166" y="2332654"/>
+            <a:ext cx="12148" cy="1548056"/>
           </a:xfrm>
           <a:prstGeom prst="line">
             <a:avLst/>
@@ -14822,6 +14822,169 @@
               </a14:hiddenFill>
             </a:ext>
           </a:extLst>
+        </p:spPr>
+      </p:pic>
+      <p:cxnSp>
+        <p:nvCxnSpPr>
+          <p:cNvPr id="2" name="Straight Connector 1">
+            <a:extLst>
+              <a:ext uri="{FF2B5EF4-FFF2-40B4-BE49-F238E27FC236}">
+                <a16:creationId xmlns:a16="http://schemas.microsoft.com/office/drawing/2014/main" id="{0CFE8B65-46F3-8CB7-C825-7AD26819B9E7}"/>
+              </a:ext>
+            </a:extLst>
+          </p:cNvPr>
+          <p:cNvCxnSpPr>
+            <a:cxnSpLocks/>
+          </p:cNvCxnSpPr>
+          <p:nvPr/>
+        </p:nvCxnSpPr>
+        <p:spPr>
+          <a:xfrm>
+            <a:off x="4637314" y="3726413"/>
+            <a:ext cx="449132" cy="0"/>
+          </a:xfrm>
+          <a:prstGeom prst="line">
+            <a:avLst/>
+          </a:prstGeom>
+          <a:ln w="28575">
+            <a:solidFill>
+              <a:schemeClr val="bg1">
+                <a:lumMod val="50000"/>
+              </a:schemeClr>
+            </a:solidFill>
+          </a:ln>
+        </p:spPr>
+        <p:style>
+          <a:lnRef idx="1">
+            <a:schemeClr val="accent1"/>
+          </a:lnRef>
+          <a:fillRef idx="0">
+            <a:schemeClr val="accent1"/>
+          </a:fillRef>
+          <a:effectRef idx="0">
+            <a:schemeClr val="accent1"/>
+          </a:effectRef>
+          <a:fontRef idx="minor">
+            <a:schemeClr val="tx1"/>
+          </a:fontRef>
+        </p:style>
+      </p:cxnSp>
+      <p:sp>
+        <p:nvSpPr>
+          <p:cNvPr id="7" name="TextBox 6">
+            <a:extLst>
+              <a:ext uri="{FF2B5EF4-FFF2-40B4-BE49-F238E27FC236}">
+                <a16:creationId xmlns:a16="http://schemas.microsoft.com/office/drawing/2014/main" id="{D83449A4-4321-BBB9-0015-3B28FE30BF39}"/>
+              </a:ext>
+            </a:extLst>
+          </p:cNvPr>
+          <p:cNvSpPr txBox="1"/>
+          <p:nvPr/>
+        </p:nvSpPr>
+        <p:spPr>
+          <a:xfrm>
+            <a:off x="6105705" y="3542156"/>
+            <a:ext cx="3010301" cy="338554"/>
+          </a:xfrm>
+          <a:prstGeom prst="rect">
+            <a:avLst/>
+          </a:prstGeom>
+          <a:noFill/>
+        </p:spPr>
+        <p:txBody>
+          <a:bodyPr wrap="square" rtlCol="0">
+            <a:spAutoFit/>
+          </a:bodyPr>
+          <a:lstStyle/>
+          <a:p>
+            <a:pPr marL="0" marR="0" lvl="0" indent="0" algn="l" defTabSz="914400" rtl="0" eaLnBrk="1" fontAlgn="auto" latinLnBrk="0" hangingPunct="1">
+              <a:lnSpc>
+                <a:spcPct val="100000"/>
+              </a:lnSpc>
+              <a:spcBef>
+                <a:spcPts val="0"/>
+              </a:spcBef>
+              <a:spcAft>
+                <a:spcPts val="0"/>
+              </a:spcAft>
+              <a:buClrTx/>
+              <a:buSzTx/>
+              <a:buFontTx/>
+              <a:buNone/>
+              <a:tabLst/>
+              <a:defRPr/>
+            </a:pPr>
+            <a:r>
+              <a:rPr kumimoji="0" lang="de-DE" sz="1600" b="0" i="0" u="none" strike="noStrike" kern="1200" cap="none" spc="0" normalizeH="0" baseline="0" noProof="0" dirty="0">
+                <a:ln>
+                  <a:noFill/>
+                </a:ln>
+                <a:solidFill>
+                  <a:prstClr val="black"/>
+                </a:solidFill>
+                <a:effectLst/>
+                <a:uLnTx/>
+                <a:uFillTx/>
+                <a:latin typeface="Calibri" panose="020F0502020204030204"/>
+                <a:ea typeface="+mn-ea"/>
+                <a:cs typeface="+mn-cs"/>
+              </a:rPr>
+              <a:t>Storage Account</a:t>
+            </a:r>
+            <a:endParaRPr kumimoji="0" lang="en-DE" sz="1600" b="0" i="0" u="none" strike="noStrike" kern="1200" cap="none" spc="0" normalizeH="0" baseline="0" noProof="0" dirty="0">
+              <a:ln>
+                <a:noFill/>
+              </a:ln>
+              <a:solidFill>
+                <a:prstClr val="black"/>
+              </a:solidFill>
+              <a:effectLst/>
+              <a:uLnTx/>
+              <a:uFillTx/>
+              <a:latin typeface="Calibri" panose="020F0502020204030204"/>
+              <a:ea typeface="+mn-ea"/>
+              <a:cs typeface="+mn-cs"/>
+            </a:endParaRPr>
+          </a:p>
+        </p:txBody>
+      </p:sp>
+      <p:pic>
+        <p:nvPicPr>
+          <p:cNvPr id="8" name="Graphic 7">
+            <a:extLst>
+              <a:ext uri="{FF2B5EF4-FFF2-40B4-BE49-F238E27FC236}">
+                <a16:creationId xmlns:a16="http://schemas.microsoft.com/office/drawing/2014/main" id="{02116074-EE01-CF14-A30F-1C2C7D21418B}"/>
+              </a:ext>
+            </a:extLst>
+          </p:cNvPr>
+          <p:cNvPicPr>
+            <a:picLocks noChangeAspect="1"/>
+          </p:cNvPicPr>
+          <p:nvPr/>
+        </p:nvPicPr>
+        <p:blipFill>
+          <a:blip r:embed="rId12">
+            <a:extLst>
+              <a:ext uri="{28A0092B-C50C-407E-A947-70E740481C1C}">
+                <a14:useLocalDpi xmlns:a14="http://schemas.microsoft.com/office/drawing/2010/main" val="0"/>
+              </a:ext>
+              <a:ext uri="{96DAC541-7B7A-43D3-8B79-37D633B846F1}">
+                <asvg:svgBlip xmlns:asvg="http://schemas.microsoft.com/office/drawing/2016/SVG/main" r:embed="rId13"/>
+              </a:ext>
+            </a:extLst>
+          </a:blip>
+          <a:stretch>
+            <a:fillRect/>
+          </a:stretch>
+        </p:blipFill>
+        <p:spPr>
+          <a:xfrm>
+            <a:off x="5259868" y="3544173"/>
+            <a:ext cx="346400" cy="346400"/>
+          </a:xfrm>
+          <a:prstGeom prst="rect">
+            <a:avLst/>
+          </a:prstGeom>
         </p:spPr>
       </p:pic>
     </p:spTree>

</xml_diff>

<commit_message>
generator mentioned in process flow
</commit_message>
<xml_diff>
--- a/assets/drawings.pptx
+++ b/assets/drawings.pptx
@@ -14987,6 +14987,467 @@
           </a:prstGeom>
         </p:spPr>
       </p:pic>
+      <p:sp>
+        <p:nvSpPr>
+          <p:cNvPr id="9" name="Arrow: Curved Up 8">
+            <a:extLst>
+              <a:ext uri="{FF2B5EF4-FFF2-40B4-BE49-F238E27FC236}">
+                <a16:creationId xmlns:a16="http://schemas.microsoft.com/office/drawing/2014/main" id="{F89023A7-DC7D-9F61-1C12-6B2A16F81702}"/>
+              </a:ext>
+            </a:extLst>
+          </p:cNvPr>
+          <p:cNvSpPr/>
+          <p:nvPr/>
+        </p:nvSpPr>
+        <p:spPr>
+          <a:xfrm>
+            <a:off x="767313" y="4029868"/>
+            <a:ext cx="477058" cy="220684"/>
+          </a:xfrm>
+          <a:prstGeom prst="curvedUpArrow">
+            <a:avLst/>
+          </a:prstGeom>
+          <a:solidFill>
+            <a:schemeClr val="accent2"/>
+          </a:solidFill>
+          <a:ln>
+            <a:noFill/>
+          </a:ln>
+        </p:spPr>
+        <p:style>
+          <a:lnRef idx="2">
+            <a:schemeClr val="accent1">
+              <a:shade val="50000"/>
+            </a:schemeClr>
+          </a:lnRef>
+          <a:fillRef idx="1">
+            <a:schemeClr val="accent1"/>
+          </a:fillRef>
+          <a:effectRef idx="0">
+            <a:schemeClr val="accent1"/>
+          </a:effectRef>
+          <a:fontRef idx="minor">
+            <a:schemeClr val="lt1"/>
+          </a:fontRef>
+        </p:style>
+        <p:txBody>
+          <a:bodyPr rtlCol="0" anchor="ctr"/>
+          <a:lstStyle/>
+          <a:p>
+            <a:pPr algn="ctr"/>
+            <a:endParaRPr lang="en-DE">
+              <a:solidFill>
+                <a:schemeClr val="tx1"/>
+              </a:solidFill>
+            </a:endParaRPr>
+          </a:p>
+        </p:txBody>
+      </p:sp>
+      <p:sp>
+        <p:nvSpPr>
+          <p:cNvPr id="11" name="TextBox 10">
+            <a:extLst>
+              <a:ext uri="{FF2B5EF4-FFF2-40B4-BE49-F238E27FC236}">
+                <a16:creationId xmlns:a16="http://schemas.microsoft.com/office/drawing/2014/main" id="{4C364943-3041-3884-B7EF-6B73809A3B25}"/>
+              </a:ext>
+            </a:extLst>
+          </p:cNvPr>
+          <p:cNvSpPr txBox="1"/>
+          <p:nvPr/>
+        </p:nvSpPr>
+        <p:spPr>
+          <a:xfrm>
+            <a:off x="160384" y="4277676"/>
+            <a:ext cx="1750465" cy="461665"/>
+          </a:xfrm>
+          <a:prstGeom prst="rect">
+            <a:avLst/>
+          </a:prstGeom>
+          <a:noFill/>
+        </p:spPr>
+        <p:txBody>
+          <a:bodyPr wrap="square" rtlCol="0">
+            <a:spAutoFit/>
+          </a:bodyPr>
+          <a:lstStyle/>
+          <a:p>
+            <a:pPr marL="0" marR="0" lvl="0" indent="0" algn="ctr" defTabSz="914400" rtl="0" eaLnBrk="1" fontAlgn="auto" latinLnBrk="0" hangingPunct="1">
+              <a:lnSpc>
+                <a:spcPct val="100000"/>
+              </a:lnSpc>
+              <a:spcBef>
+                <a:spcPts val="0"/>
+              </a:spcBef>
+              <a:spcAft>
+                <a:spcPts val="0"/>
+              </a:spcAft>
+              <a:buClrTx/>
+              <a:buSzTx/>
+              <a:buFontTx/>
+              <a:buNone/>
+              <a:tabLst/>
+              <a:defRPr/>
+            </a:pPr>
+            <a:r>
+              <a:rPr kumimoji="0" lang="de-DE" sz="1200" b="0" i="0" u="none" strike="noStrike" kern="1200" cap="none" spc="0" normalizeH="0" baseline="0" noProof="0" dirty="0">
+                <a:ln>
+                  <a:noFill/>
+                </a:ln>
+                <a:solidFill>
+                  <a:prstClr val="black"/>
+                </a:solidFill>
+                <a:effectLst/>
+                <a:uLnTx/>
+                <a:uFillTx/>
+                <a:latin typeface="Calibri" panose="020F0502020204030204"/>
+                <a:ea typeface="+mn-ea"/>
+                <a:cs typeface="+mn-cs"/>
+              </a:rPr>
+              <a:t>Run </a:t>
+            </a:r>
+            <a:r>
+              <a:rPr kumimoji="0" lang="de-DE" sz="1200" b="0" i="0" u="none" strike="noStrike" kern="1200" cap="none" spc="0" normalizeH="0" baseline="0" noProof="0" dirty="0" err="1">
+                <a:ln>
+                  <a:noFill/>
+                </a:ln>
+                <a:solidFill>
+                  <a:prstClr val="black"/>
+                </a:solidFill>
+                <a:effectLst/>
+                <a:uLnTx/>
+                <a:uFillTx/>
+                <a:latin typeface="Calibri" panose="020F0502020204030204"/>
+                <a:ea typeface="+mn-ea"/>
+                <a:cs typeface="+mn-cs"/>
+              </a:rPr>
+              <a:t>generator</a:t>
+            </a:r>
+            <a:r>
+              <a:rPr kumimoji="0" lang="de-DE" sz="1200" b="0" i="0" u="none" strike="noStrike" kern="1200" cap="none" spc="0" normalizeH="0" baseline="0" noProof="0" dirty="0">
+                <a:ln>
+                  <a:noFill/>
+                </a:ln>
+                <a:solidFill>
+                  <a:prstClr val="black"/>
+                </a:solidFill>
+                <a:effectLst/>
+                <a:uLnTx/>
+                <a:uFillTx/>
+                <a:latin typeface="Calibri" panose="020F0502020204030204"/>
+                <a:ea typeface="+mn-ea"/>
+                <a:cs typeface="+mn-cs"/>
+              </a:rPr>
+              <a:t> </a:t>
+            </a:r>
+            <a:r>
+              <a:rPr kumimoji="0" lang="de-DE" sz="1200" b="0" i="0" u="none" strike="noStrike" kern="1200" cap="none" spc="0" normalizeH="0" baseline="0" noProof="0" dirty="0" err="1">
+                <a:ln>
+                  <a:noFill/>
+                </a:ln>
+                <a:solidFill>
+                  <a:prstClr val="black"/>
+                </a:solidFill>
+                <a:effectLst/>
+                <a:uLnTx/>
+                <a:uFillTx/>
+                <a:latin typeface="Calibri" panose="020F0502020204030204"/>
+                <a:ea typeface="+mn-ea"/>
+                <a:cs typeface="+mn-cs"/>
+              </a:rPr>
+              <a:t>for</a:t>
+            </a:r>
+            <a:r>
+              <a:rPr kumimoji="0" lang="de-DE" sz="1200" b="0" i="0" u="none" strike="noStrike" kern="1200" cap="none" spc="0" normalizeH="0" baseline="0" noProof="0" dirty="0">
+                <a:ln>
+                  <a:noFill/>
+                </a:ln>
+                <a:solidFill>
+                  <a:prstClr val="black"/>
+                </a:solidFill>
+                <a:effectLst/>
+                <a:uLnTx/>
+                <a:uFillTx/>
+                <a:latin typeface="Calibri" panose="020F0502020204030204"/>
+                <a:ea typeface="+mn-ea"/>
+                <a:cs typeface="+mn-cs"/>
+              </a:rPr>
+              <a:t> </a:t>
+            </a:r>
+            <a:r>
+              <a:rPr kumimoji="0" lang="de-DE" sz="1200" b="0" i="0" u="none" strike="noStrike" kern="1200" cap="none" spc="0" normalizeH="0" baseline="0" noProof="0" dirty="0" err="1">
+                <a:ln>
+                  <a:noFill/>
+                </a:ln>
+                <a:solidFill>
+                  <a:prstClr val="black"/>
+                </a:solidFill>
+                <a:effectLst/>
+                <a:uLnTx/>
+                <a:uFillTx/>
+                <a:latin typeface="Calibri" panose="020F0502020204030204"/>
+                <a:ea typeface="+mn-ea"/>
+                <a:cs typeface="+mn-cs"/>
+              </a:rPr>
+              <a:t>your</a:t>
+            </a:r>
+            <a:r>
+              <a:rPr kumimoji="0" lang="de-DE" sz="1200" b="0" i="0" u="none" strike="noStrike" kern="1200" cap="none" spc="0" normalizeH="0" baseline="0" noProof="0" dirty="0">
+                <a:ln>
+                  <a:noFill/>
+                </a:ln>
+                <a:solidFill>
+                  <a:prstClr val="black"/>
+                </a:solidFill>
+                <a:effectLst/>
+                <a:uLnTx/>
+                <a:uFillTx/>
+                <a:latin typeface="Calibri" panose="020F0502020204030204"/>
+                <a:ea typeface="+mn-ea"/>
+                <a:cs typeface="+mn-cs"/>
+              </a:rPr>
+              <a:t> </a:t>
+            </a:r>
+            <a:r>
+              <a:rPr kumimoji="0" lang="de-DE" sz="1200" b="0" i="0" u="none" strike="noStrike" kern="1200" cap="none" spc="0" normalizeH="0" baseline="0" noProof="0" dirty="0" err="1">
+                <a:ln>
+                  <a:noFill/>
+                </a:ln>
+                <a:solidFill>
+                  <a:prstClr val="black"/>
+                </a:solidFill>
+                <a:effectLst/>
+                <a:uLnTx/>
+                <a:uFillTx/>
+                <a:latin typeface="Calibri" panose="020F0502020204030204"/>
+                <a:ea typeface="+mn-ea"/>
+                <a:cs typeface="+mn-cs"/>
+              </a:rPr>
+              <a:t>OData</a:t>
+            </a:r>
+            <a:r>
+              <a:rPr lang="de-DE" sz="1200" dirty="0">
+                <a:solidFill>
+                  <a:prstClr val="black"/>
+                </a:solidFill>
+                <a:latin typeface="Calibri" panose="020F0502020204030204"/>
+              </a:rPr>
+              <a:t> metadata.xml</a:t>
+            </a:r>
+            <a:endParaRPr kumimoji="0" lang="en-DE" sz="1200" b="0" i="0" u="none" strike="noStrike" kern="1200" cap="none" spc="0" normalizeH="0" baseline="0" noProof="0" dirty="0">
+              <a:ln>
+                <a:noFill/>
+              </a:ln>
+              <a:solidFill>
+                <a:prstClr val="black"/>
+              </a:solidFill>
+              <a:effectLst/>
+              <a:uLnTx/>
+              <a:uFillTx/>
+              <a:latin typeface="Calibri" panose="020F0502020204030204"/>
+              <a:ea typeface="+mn-ea"/>
+              <a:cs typeface="+mn-cs"/>
+            </a:endParaRPr>
+          </a:p>
+        </p:txBody>
+      </p:sp>
+      <p:sp>
+        <p:nvSpPr>
+          <p:cNvPr id="12" name="Oval 11">
+            <a:extLst>
+              <a:ext uri="{FF2B5EF4-FFF2-40B4-BE49-F238E27FC236}">
+                <a16:creationId xmlns:a16="http://schemas.microsoft.com/office/drawing/2014/main" id="{D676C5A4-96AE-4387-B37A-4011F8C816B5}"/>
+              </a:ext>
+            </a:extLst>
+          </p:cNvPr>
+          <p:cNvSpPr/>
+          <p:nvPr/>
+        </p:nvSpPr>
+        <p:spPr>
+          <a:xfrm>
+            <a:off x="405003" y="3975069"/>
+            <a:ext cx="224201" cy="229979"/>
+          </a:xfrm>
+          <a:prstGeom prst="ellipse">
+            <a:avLst/>
+          </a:prstGeom>
+          <a:noFill/>
+          <a:ln w="9525" cap="flat" cmpd="sng" algn="ctr">
+            <a:solidFill>
+              <a:schemeClr val="accent3"/>
+            </a:solidFill>
+            <a:prstDash val="solid"/>
+            <a:round/>
+            <a:headEnd type="none" w="med" len="med"/>
+            <a:tailEnd type="none" w="med" len="med"/>
+          </a:ln>
+        </p:spPr>
+        <p:style>
+          <a:lnRef idx="0">
+            <a:scrgbClr r="0" g="0" b="0"/>
+          </a:lnRef>
+          <a:fillRef idx="0">
+            <a:scrgbClr r="0" g="0" b="0"/>
+          </a:fillRef>
+          <a:effectRef idx="0">
+            <a:scrgbClr r="0" g="0" b="0"/>
+          </a:effectRef>
+          <a:fontRef idx="minor">
+            <a:schemeClr val="accent3"/>
+          </a:fontRef>
+        </p:style>
+        <p:txBody>
+          <a:bodyPr rtlCol="0" anchor="ctr"/>
+          <a:lstStyle/>
+          <a:p>
+            <a:pPr algn="ctr"/>
+            <a:r>
+              <a:rPr lang="de-DE" sz="1400" dirty="0">
+                <a:solidFill>
+                  <a:schemeClr val="tx1"/>
+                </a:solidFill>
+              </a:rPr>
+              <a:t>0</a:t>
+            </a:r>
+            <a:endParaRPr lang="en-DE" sz="1400" dirty="0">
+              <a:solidFill>
+                <a:schemeClr val="tx1"/>
+              </a:solidFill>
+            </a:endParaRPr>
+          </a:p>
+        </p:txBody>
+      </p:sp>
+      <p:sp>
+        <p:nvSpPr>
+          <p:cNvPr id="13" name="Oval 12">
+            <a:extLst>
+              <a:ext uri="{FF2B5EF4-FFF2-40B4-BE49-F238E27FC236}">
+                <a16:creationId xmlns:a16="http://schemas.microsoft.com/office/drawing/2014/main" id="{987325F8-03B3-BFD2-AB9C-E58B05B1D966}"/>
+              </a:ext>
+            </a:extLst>
+          </p:cNvPr>
+          <p:cNvSpPr/>
+          <p:nvPr/>
+        </p:nvSpPr>
+        <p:spPr>
+          <a:xfrm>
+            <a:off x="2132516" y="3449323"/>
+            <a:ext cx="224201" cy="229979"/>
+          </a:xfrm>
+          <a:prstGeom prst="ellipse">
+            <a:avLst/>
+          </a:prstGeom>
+          <a:noFill/>
+          <a:ln w="9525" cap="flat" cmpd="sng" algn="ctr">
+            <a:solidFill>
+              <a:schemeClr val="accent3"/>
+            </a:solidFill>
+            <a:prstDash val="solid"/>
+            <a:round/>
+            <a:headEnd type="none" w="med" len="med"/>
+            <a:tailEnd type="none" w="med" len="med"/>
+          </a:ln>
+        </p:spPr>
+        <p:style>
+          <a:lnRef idx="0">
+            <a:scrgbClr r="0" g="0" b="0"/>
+          </a:lnRef>
+          <a:fillRef idx="0">
+            <a:scrgbClr r="0" g="0" b="0"/>
+          </a:fillRef>
+          <a:effectRef idx="0">
+            <a:scrgbClr r="0" g="0" b="0"/>
+          </a:effectRef>
+          <a:fontRef idx="minor">
+            <a:schemeClr val="accent3"/>
+          </a:fontRef>
+        </p:style>
+        <p:txBody>
+          <a:bodyPr rtlCol="0" anchor="ctr"/>
+          <a:lstStyle/>
+          <a:p>
+            <a:pPr algn="ctr"/>
+            <a:r>
+              <a:rPr lang="de-DE" sz="1400" dirty="0">
+                <a:solidFill>
+                  <a:schemeClr val="tx1"/>
+                </a:solidFill>
+              </a:rPr>
+              <a:t>1</a:t>
+            </a:r>
+            <a:endParaRPr lang="en-DE" sz="1400" dirty="0">
+              <a:solidFill>
+                <a:schemeClr val="tx1"/>
+              </a:solidFill>
+            </a:endParaRPr>
+          </a:p>
+        </p:txBody>
+      </p:sp>
+      <p:sp>
+        <p:nvSpPr>
+          <p:cNvPr id="14" name="Oval 13">
+            <a:extLst>
+              <a:ext uri="{FF2B5EF4-FFF2-40B4-BE49-F238E27FC236}">
+                <a16:creationId xmlns:a16="http://schemas.microsoft.com/office/drawing/2014/main" id="{18424B5B-D65F-728C-E270-99FBB574C95D}"/>
+              </a:ext>
+            </a:extLst>
+          </p:cNvPr>
+          <p:cNvSpPr/>
+          <p:nvPr/>
+        </p:nvSpPr>
+        <p:spPr>
+          <a:xfrm>
+            <a:off x="10540682" y="3577447"/>
+            <a:ext cx="224201" cy="229979"/>
+          </a:xfrm>
+          <a:prstGeom prst="ellipse">
+            <a:avLst/>
+          </a:prstGeom>
+          <a:noFill/>
+          <a:ln w="9525" cap="flat" cmpd="sng" algn="ctr">
+            <a:solidFill>
+              <a:schemeClr val="accent3"/>
+            </a:solidFill>
+            <a:prstDash val="solid"/>
+            <a:round/>
+            <a:headEnd type="none" w="med" len="med"/>
+            <a:tailEnd type="none" w="med" len="med"/>
+          </a:ln>
+        </p:spPr>
+        <p:style>
+          <a:lnRef idx="0">
+            <a:scrgbClr r="0" g="0" b="0"/>
+          </a:lnRef>
+          <a:fillRef idx="0">
+            <a:scrgbClr r="0" g="0" b="0"/>
+          </a:fillRef>
+          <a:effectRef idx="0">
+            <a:scrgbClr r="0" g="0" b="0"/>
+          </a:effectRef>
+          <a:fontRef idx="minor">
+            <a:schemeClr val="accent3"/>
+          </a:fontRef>
+        </p:style>
+        <p:txBody>
+          <a:bodyPr rtlCol="0" anchor="ctr"/>
+          <a:lstStyle/>
+          <a:p>
+            <a:pPr algn="ctr"/>
+            <a:r>
+              <a:rPr lang="de-DE" sz="1400" dirty="0">
+                <a:solidFill>
+                  <a:schemeClr val="tx1"/>
+                </a:solidFill>
+              </a:rPr>
+              <a:t>2</a:t>
+            </a:r>
+            <a:endParaRPr lang="en-DE" sz="1400" dirty="0">
+              <a:solidFill>
+                <a:schemeClr val="tx1"/>
+              </a:solidFill>
+            </a:endParaRPr>
+          </a:p>
+        </p:txBody>
+      </p:sp>
     </p:spTree>
     <p:extLst>
       <p:ext uri="{BB962C8B-B14F-4D97-AF65-F5344CB8AC3E}">

</xml_diff>